<commit_message>
Changed explanation of b_0
</commit_message>
<xml_diff>
--- a/slides/04_logistic_regression.pptx
+++ b/slides/04_logistic_regression.pptx
@@ -286,7 +286,7 @@
           <a:p>
             <a:fld id="{DB92F479-4B50-F243-9713-1B12EC2B4BDB}" type="datetimeFigureOut">
               <a:rPr lang="en-US" smtClean="0"/>
-              <a:t>11/4/2014</a:t>
+              <a:t>3/13/2015</a:t>
             </a:fld>
             <a:endParaRPr lang="en-US"/>
           </a:p>
@@ -1557,8 +1557,25 @@
                 <a:latin typeface="ArialMT"/>
                 <a:sym typeface="Wingdings"/>
               </a:rPr>
-              <a:t>You want the model to reflect different probabilities based on the value of x to reflect that as you increase x, you increase probability, and vice-versa.</a:t>
-            </a:r>
+              <a:t>You want the </a:t>
+            </a:r>
+            <a:r>
+              <a:rPr lang="en-US" sz="1200" baseline="0" dirty="0" smtClean="0">
+                <a:solidFill>
+                  <a:prstClr val="black"/>
+                </a:solidFill>
+                <a:latin typeface="ArialMT"/>
+                <a:sym typeface="Wingdings"/>
+              </a:rPr>
+              <a:t>marginal increase in probability to decrease as the independent variable approaches it’s extremities.</a:t>
+            </a:r>
+            <a:endParaRPr lang="en-US" sz="1200" baseline="0" dirty="0" smtClean="0">
+              <a:solidFill>
+                <a:prstClr val="black"/>
+              </a:solidFill>
+              <a:latin typeface="ArialMT"/>
+              <a:sym typeface="Wingdings"/>
+            </a:endParaRPr>
           </a:p>
         </p:txBody>
       </p:sp>
@@ -2418,13 +2435,6 @@
               </a:rPr>
               <a:t>Q: What is the range of the odds ratio?</a:t>
             </a:r>
-            <a:endParaRPr lang="en-US" sz="1200" baseline="0" dirty="0" smtClean="0">
-              <a:solidFill>
-                <a:prstClr val="black"/>
-              </a:solidFill>
-              <a:latin typeface="ArialMT"/>
-              <a:sym typeface="Wingdings"/>
-            </a:endParaRPr>
           </a:p>
         </p:txBody>
       </p:sp>
@@ -18734,7 +18744,21 @@
                 <a:latin typeface="PFDinTextCompPro-Italic"/>
                 <a:cs typeface="PFDinTextCompPro-Italic"/>
               </a:rPr>
-              <a:t>In linear regression, we used a set of input variables to predict the value of a continuous response variable.</a:t>
+              <a:t>In linear regression, we </a:t>
+            </a:r>
+            <a:r>
+              <a:rPr lang="en-US" sz="3000" dirty="0" smtClean="0">
+                <a:latin typeface="PFDinTextCompPro-Italic"/>
+                <a:cs typeface="PFDinTextCompPro-Italic"/>
+              </a:rPr>
+              <a:t>use </a:t>
+            </a:r>
+            <a:r>
+              <a:rPr lang="en-US" sz="3000" dirty="0" smtClean="0">
+                <a:latin typeface="PFDinTextCompPro-Italic"/>
+                <a:cs typeface="PFDinTextCompPro-Italic"/>
+              </a:rPr>
+              <a:t>a set of input variables to predict the value of a continuous response variable.</a:t>
             </a:r>
           </a:p>
           <a:p>
@@ -19126,7 +19150,21 @@
                 <a:latin typeface="PFDinTextCompPro-Italic"/>
                 <a:cs typeface="PFDinTextCompPro-Italic"/>
               </a:rPr>
-              <a:t>In linear regression, we used a set of input variables to predict the value of a continuous response variable.</a:t>
+              <a:t>In linear regression, we </a:t>
+            </a:r>
+            <a:r>
+              <a:rPr lang="en-US" sz="3000" dirty="0" smtClean="0">
+                <a:latin typeface="PFDinTextCompPro-Italic"/>
+                <a:cs typeface="PFDinTextCompPro-Italic"/>
+              </a:rPr>
+              <a:t>use </a:t>
+            </a:r>
+            <a:r>
+              <a:rPr lang="en-US" sz="3000" dirty="0">
+                <a:latin typeface="PFDinTextCompPro-Italic"/>
+                <a:cs typeface="PFDinTextCompPro-Italic"/>
+              </a:rPr>
+              <a:t>a set of input variables to predict the value of a continuous response variable.</a:t>
             </a:r>
           </a:p>
           <a:p>
@@ -19395,7 +19433,7 @@
           <a:graphicData uri="http://schemas.openxmlformats.org/presentationml/2006/ole">
             <mc:AlternateContent xmlns:mc="http://schemas.openxmlformats.org/markup-compatibility/2006">
               <mc:Choice xmlns:v="urn:schemas-microsoft-com:vml" Requires="v">
-                <p:oleObj spid="_x0000_s10364" name="Equation" r:id="rId4" imgW="1726920" imgH="419040" progId="Equation.3">
+                <p:oleObj spid="_x0000_s10368" name="Equation" r:id="rId4" imgW="1726920" imgH="419040" progId="Equation.3">
                   <p:embed/>
                 </p:oleObj>
               </mc:Choice>
@@ -19478,7 +19516,7 @@
           <a:graphicData uri="http://schemas.openxmlformats.org/presentationml/2006/ole">
             <mc:AlternateContent xmlns:mc="http://schemas.openxmlformats.org/markup-compatibility/2006">
               <mc:Choice xmlns:v="urn:schemas-microsoft-com:vml" Requires="v">
-                <p:oleObj spid="_x0000_s10365" name="Equation" r:id="rId6" imgW="787320" imgH="228600" progId="Equation.3">
+                <p:oleObj spid="_x0000_s10369" name="Equation" r:id="rId6" imgW="787320" imgH="228600" progId="Equation.3">
                   <p:embed/>
                 </p:oleObj>
               </mc:Choice>
@@ -19733,7 +19771,7 @@
           <a:graphicData uri="http://schemas.openxmlformats.org/presentationml/2006/ole">
             <mc:AlternateContent xmlns:mc="http://schemas.openxmlformats.org/markup-compatibility/2006">
               <mc:Choice xmlns:v="urn:schemas-microsoft-com:vml" Requires="v">
-                <p:oleObj spid="_x0000_s14455" name="Equation" r:id="rId4" imgW="1726920" imgH="419040" progId="Equation.3">
+                <p:oleObj spid="_x0000_s14459" name="Equation" r:id="rId4" imgW="1726920" imgH="419040" progId="Equation.3">
                   <p:embed/>
                 </p:oleObj>
               </mc:Choice>
@@ -19816,7 +19854,7 @@
           <a:graphicData uri="http://schemas.openxmlformats.org/presentationml/2006/ole">
             <mc:AlternateContent xmlns:mc="http://schemas.openxmlformats.org/markup-compatibility/2006">
               <mc:Choice xmlns:v="urn:schemas-microsoft-com:vml" Requires="v">
-                <p:oleObj spid="_x0000_s14456" name="Equation" r:id="rId6" imgW="787320" imgH="228600" progId="Equation.3">
+                <p:oleObj spid="_x0000_s14460" name="Equation" r:id="rId6" imgW="787320" imgH="228600" progId="Equation.3">
                   <p:embed/>
                 </p:oleObj>
               </mc:Choice>
@@ -20123,7 +20161,7 @@
           <a:graphicData uri="http://schemas.openxmlformats.org/presentationml/2006/ole">
             <mc:AlternateContent xmlns:mc="http://schemas.openxmlformats.org/markup-compatibility/2006">
               <mc:Choice xmlns:v="urn:schemas-microsoft-com:vml" Requires="v">
-                <p:oleObj spid="_x0000_s18493" name="Equation" r:id="rId4" imgW="876240" imgH="419040" progId="Equation.3">
+                <p:oleObj spid="_x0000_s18495" name="Equation" r:id="rId4" imgW="876240" imgH="419040" progId="Equation.3">
                   <p:embed/>
                 </p:oleObj>
               </mc:Choice>
@@ -20384,7 +20422,7 @@
           <a:graphicData uri="http://schemas.openxmlformats.org/presentationml/2006/ole">
             <mc:AlternateContent xmlns:mc="http://schemas.openxmlformats.org/markup-compatibility/2006">
               <mc:Choice xmlns:v="urn:schemas-microsoft-com:vml" Requires="v">
-                <p:oleObj spid="_x0000_s19517" name="Equation" r:id="rId4" imgW="876240" imgH="419040" progId="Equation.3">
+                <p:oleObj spid="_x0000_s19519" name="Equation" r:id="rId4" imgW="876240" imgH="419040" progId="Equation.3">
                   <p:embed/>
                 </p:oleObj>
               </mc:Choice>
@@ -20600,7 +20638,7 @@
           <a:graphicData uri="http://schemas.openxmlformats.org/presentationml/2006/ole">
             <mc:AlternateContent xmlns:mc="http://schemas.openxmlformats.org/markup-compatibility/2006">
               <mc:Choice xmlns:v="urn:schemas-microsoft-com:vml" Requires="v">
-                <p:oleObj spid="_x0000_s11383" name="Equation" r:id="rId4" imgW="876240" imgH="419040" progId="Equation.3">
+                <p:oleObj spid="_x0000_s11385" name="Equation" r:id="rId4" imgW="876240" imgH="419040" progId="Equation.3">
                   <p:embed/>
                 </p:oleObj>
               </mc:Choice>
@@ -20898,7 +20936,7 @@
           <a:graphicData uri="http://schemas.openxmlformats.org/presentationml/2006/ole">
             <mc:AlternateContent xmlns:mc="http://schemas.openxmlformats.org/markup-compatibility/2006">
               <mc:Choice xmlns:v="urn:schemas-microsoft-com:vml" Requires="v">
-                <p:oleObj spid="_x0000_s15476" name="Equation" r:id="rId5" imgW="876240" imgH="419040" progId="Equation.3">
+                <p:oleObj spid="_x0000_s15478" name="Equation" r:id="rId5" imgW="876240" imgH="419040" progId="Equation.3">
                   <p:embed/>
                 </p:oleObj>
               </mc:Choice>
@@ -21324,8 +21362,19 @@
                 <a:latin typeface="PFDinTextCompPro-Italic"/>
                 <a:cs typeface="PFDinTextCompPro-Italic"/>
               </a:rPr>
-              <a:t> value shifts the function horizontally.</a:t>
-            </a:r>
+              <a:t> value shifts the </a:t>
+            </a:r>
+            <a:r>
+              <a:rPr lang="en-US" sz="3000" dirty="0" smtClean="0">
+                <a:latin typeface="PFDinTextCompPro-Italic"/>
+                <a:cs typeface="PFDinTextCompPro-Italic"/>
+              </a:rPr>
+              <a:t>y-intercept vertically.</a:t>
+            </a:r>
+            <a:endParaRPr lang="en-US" sz="3000" dirty="0" smtClean="0">
+              <a:latin typeface="PFDinTextCompPro-Italic"/>
+              <a:cs typeface="PFDinTextCompPro-Italic"/>
+            </a:endParaRPr>
           </a:p>
         </p:txBody>
       </p:sp>
@@ -21644,7 +21693,7 @@
               </a14:hiddenLine>
             </a:ext>
             <a:ext uri="{FAA26D3D-D897-4be2-8F04-BA451C77F1D7}">
-              <ma14:placeholderFlag xmlns:ma14="http://schemas.microsoft.com/office/mac/drawingml/2011/main" xmlns="" val="1"/>
+              <ma14:placeholderFlag xmlns="" xmlns:ma14="http://schemas.microsoft.com/office/mac/drawingml/2011/main" val="1"/>
             </a:ext>
           </a:extLst>
         </p:spPr>
@@ -22458,7 +22507,7 @@
           <a:graphicData uri="http://schemas.openxmlformats.org/presentationml/2006/ole">
             <mc:AlternateContent xmlns:mc="http://schemas.openxmlformats.org/markup-compatibility/2006">
               <mc:Choice xmlns:v="urn:schemas-microsoft-com:vml" Requires="v">
-                <p:oleObj spid="_x0000_s31805" name="Equation" r:id="rId4" imgW="825480" imgH="393480" progId="Equation.3">
+                <p:oleObj spid="_x0000_s31807" name="Equation" r:id="rId4" imgW="825480" imgH="393480" progId="Equation.3">
                   <p:embed/>
                 </p:oleObj>
               </mc:Choice>
@@ -22723,7 +22772,7 @@
           <a:graphicData uri="http://schemas.openxmlformats.org/presentationml/2006/ole">
             <mc:AlternateContent xmlns:mc="http://schemas.openxmlformats.org/markup-compatibility/2006">
               <mc:Choice xmlns:v="urn:schemas-microsoft-com:vml" Requires="v">
-                <p:oleObj spid="_x0000_s49189" name="Equation" r:id="rId4" imgW="825480" imgH="393480" progId="Equation.3">
+                <p:oleObj spid="_x0000_s49191" name="Equation" r:id="rId4" imgW="825480" imgH="393480" progId="Equation.3">
                   <p:embed/>
                 </p:oleObj>
               </mc:Choice>
@@ -23000,29 +23049,8 @@
                   <a:cs typeface="PFDinTextCompPro-Italic"/>
                   <a:sym typeface="News706 BT" charset="0"/>
                 </a:rPr>
-                <a:t>What is th</a:t>
+                <a:t>What is the range of the odds? </a:t>
               </a:r>
-              <a:r>
-                <a:rPr lang="en-US" sz="1400" dirty="0" smtClean="0">
-                  <a:solidFill>
-                    <a:schemeClr val="tx1"/>
-                  </a:solidFill>
-                  <a:latin typeface="+mn-lt"/>
-                  <a:ea typeface="ＭＳ Ｐゴシック" charset="0"/>
-                  <a:cs typeface="PFDinTextCompPro-Italic"/>
-                  <a:sym typeface="News706 BT" charset="0"/>
-                </a:rPr>
-                <a:t>e range of the odds? </a:t>
-              </a:r>
-              <a:endParaRPr lang="en-US" sz="1400" dirty="0" smtClean="0">
-                <a:solidFill>
-                  <a:schemeClr val="tx1"/>
-                </a:solidFill>
-                <a:latin typeface="+mn-lt"/>
-                <a:ea typeface="ＭＳ Ｐゴシック" charset="0"/>
-                <a:cs typeface="PFDinTextCompPro-Italic"/>
-                <a:sym typeface="News706 BT" charset="0"/>
-              </a:endParaRPr>
             </a:p>
           </p:txBody>
         </p:sp>
@@ -23387,7 +23415,7 @@
           <a:graphicData uri="http://schemas.openxmlformats.org/presentationml/2006/ole">
             <mc:AlternateContent xmlns:mc="http://schemas.openxmlformats.org/markup-compatibility/2006">
               <mc:Choice xmlns:v="urn:schemas-microsoft-com:vml" Requires="v">
-                <p:oleObj spid="_x0000_s30783" name="Equation" r:id="rId4" imgW="825480" imgH="393480" progId="Equation.3">
+                <p:oleObj spid="_x0000_s30785" name="Equation" r:id="rId4" imgW="825480" imgH="393480" progId="Equation.3">
                   <p:embed/>
                 </p:oleObj>
               </mc:Choice>
@@ -23571,7 +23599,7 @@
           <a:graphicData uri="http://schemas.openxmlformats.org/presentationml/2006/ole">
             <mc:AlternateContent xmlns:mc="http://schemas.openxmlformats.org/markup-compatibility/2006">
               <mc:Choice xmlns:v="urn:schemas-microsoft-com:vml" Requires="v">
-                <p:oleObj spid="_x0000_s28740" name="Equation" r:id="rId4" imgW="1587240" imgH="393480" progId="Equation.3">
+                <p:oleObj spid="_x0000_s28742" name="Equation" r:id="rId4" imgW="1587240" imgH="393480" progId="Equation.3">
                   <p:embed/>
                 </p:oleObj>
               </mc:Choice>
@@ -24095,7 +24123,7 @@
           <a:graphicData uri="http://schemas.openxmlformats.org/presentationml/2006/ole">
             <mc:AlternateContent xmlns:mc="http://schemas.openxmlformats.org/markup-compatibility/2006">
               <mc:Choice xmlns:v="urn:schemas-microsoft-com:vml" Requires="v">
-                <p:oleObj spid="_x0000_s39998" name="Equation" r:id="rId5" imgW="1587240" imgH="393480" progId="Equation.3">
+                <p:oleObj spid="_x0000_s40000" name="Equation" r:id="rId5" imgW="1587240" imgH="393480" progId="Equation.3">
                   <p:embed/>
                 </p:oleObj>
               </mc:Choice>
@@ -24346,7 +24374,7 @@
           <a:graphicData uri="http://schemas.openxmlformats.org/presentationml/2006/ole">
             <mc:AlternateContent xmlns:mc="http://schemas.openxmlformats.org/markup-compatibility/2006">
               <mc:Choice xmlns:v="urn:schemas-microsoft-com:vml" Requires="v">
-                <p:oleObj spid="_x0000_s41015" name="Equation" r:id="rId4" imgW="1815840" imgH="457200" progId="Equation.3">
+                <p:oleObj spid="_x0000_s41017" name="Equation" r:id="rId4" imgW="1815840" imgH="457200" progId="Equation.3">
                   <p:embed/>
                 </p:oleObj>
               </mc:Choice>
@@ -24708,7 +24736,7 @@
           <a:graphicData uri="http://schemas.openxmlformats.org/presentationml/2006/ole">
             <mc:AlternateContent xmlns:mc="http://schemas.openxmlformats.org/markup-compatibility/2006">
               <mc:Choice xmlns:v="urn:schemas-microsoft-com:vml" Requires="v">
-                <p:oleObj spid="_x0000_s35954" name="Equation" r:id="rId4" imgW="1815840" imgH="457200" progId="Equation.3">
+                <p:oleObj spid="_x0000_s35958" name="Equation" r:id="rId4" imgW="1815840" imgH="457200" progId="Equation.3">
                   <p:embed/>
                 </p:oleObj>
               </mc:Choice>
@@ -24791,7 +24819,7 @@
           <a:graphicData uri="http://schemas.openxmlformats.org/presentationml/2006/ole">
             <mc:AlternateContent xmlns:mc="http://schemas.openxmlformats.org/markup-compatibility/2006">
               <mc:Choice xmlns:v="urn:schemas-microsoft-com:vml" Requires="v">
-                <p:oleObj spid="_x0000_s35955" name="Equation" r:id="rId6" imgW="3340080" imgH="457200" progId="Equation.3">
+                <p:oleObj spid="_x0000_s35959" name="Equation" r:id="rId6" imgW="3340080" imgH="457200" progId="Equation.3">
                   <p:embed/>
                 </p:oleObj>
               </mc:Choice>
@@ -25036,7 +25064,7 @@
           <a:graphicData uri="http://schemas.openxmlformats.org/presentationml/2006/ole">
             <mc:AlternateContent xmlns:mc="http://schemas.openxmlformats.org/markup-compatibility/2006">
               <mc:Choice xmlns:v="urn:schemas-microsoft-com:vml" Requires="v">
-                <p:oleObj spid="_x0000_s34877" name="Equation" r:id="rId4" imgW="2120760" imgH="393480" progId="Equation.3">
+                <p:oleObj spid="_x0000_s34879" name="Equation" r:id="rId4" imgW="2120760" imgH="393480" progId="Equation.3">
                   <p:embed/>
                 </p:oleObj>
               </mc:Choice>
@@ -25281,7 +25309,7 @@
           <a:graphicData uri="http://schemas.openxmlformats.org/presentationml/2006/ole">
             <mc:AlternateContent xmlns:mc="http://schemas.openxmlformats.org/markup-compatibility/2006">
               <mc:Choice xmlns:v="urn:schemas-microsoft-com:vml" Requires="v">
-                <p:oleObj spid="_x0000_s50178" name="Equation" r:id="rId4" imgW="2120760" imgH="393480" progId="Equation.3">
+                <p:oleObj spid="_x0000_s50180" name="Equation" r:id="rId4" imgW="2120760" imgH="393480" progId="Equation.3">
                   <p:embed/>
                 </p:oleObj>
               </mc:Choice>
@@ -25566,15 +25594,6 @@
                 </a:rPr>
                 <a:t> function?</a:t>
               </a:r>
-              <a:endParaRPr lang="en-US" sz="1400" dirty="0" smtClean="0">
-                <a:solidFill>
-                  <a:schemeClr val="tx1"/>
-                </a:solidFill>
-                <a:latin typeface="+mn-lt"/>
-                <a:ea typeface="ＭＳ Ｐゴシック" charset="0"/>
-                <a:cs typeface="PFDinTextCompPro-Italic"/>
-                <a:sym typeface="News706 BT" charset="0"/>
-              </a:endParaRPr>
             </a:p>
           </p:txBody>
         </p:sp>
@@ -25794,7 +25813,7 @@
           <a:graphicData uri="http://schemas.openxmlformats.org/presentationml/2006/ole">
             <mc:AlternateContent xmlns:mc="http://schemas.openxmlformats.org/markup-compatibility/2006">
               <mc:Choice xmlns:v="urn:schemas-microsoft-com:vml" Requires="v">
-                <p:oleObj spid="_x0000_s37951" name="Equation" r:id="rId4" imgW="2120760" imgH="393480" progId="Equation.3">
+                <p:oleObj spid="_x0000_s37953" name="Equation" r:id="rId4" imgW="2120760" imgH="393480" progId="Equation.3">
                   <p:embed/>
                 </p:oleObj>
               </mc:Choice>
@@ -26519,7 +26538,7 @@
           <a:graphicData uri="http://schemas.openxmlformats.org/presentationml/2006/ole">
             <mc:AlternateContent xmlns:mc="http://schemas.openxmlformats.org/markup-compatibility/2006">
               <mc:Choice xmlns:v="urn:schemas-microsoft-com:vml" Requires="v">
-                <p:oleObj spid="_x0000_s44079" name="Equation" r:id="rId4" imgW="215640" imgH="203040" progId="Equation.3">
+                <p:oleObj spid="_x0000_s44081" name="Equation" r:id="rId4" imgW="215640" imgH="203040" progId="Equation.3">
                   <p:embed/>
                 </p:oleObj>
               </mc:Choice>
@@ -27976,7 +27995,7 @@
           <a:graphicData uri="http://schemas.openxmlformats.org/presentationml/2006/ole">
             <mc:AlternateContent xmlns:mc="http://schemas.openxmlformats.org/markup-compatibility/2006">
               <mc:Choice xmlns:v="urn:schemas-microsoft-com:vml" Requires="v">
-                <p:oleObj spid="_x0000_s47147" name="Equation" r:id="rId4" imgW="2425680" imgH="393480" progId="Equation.3">
+                <p:oleObj spid="_x0000_s47149" name="Equation" r:id="rId4" imgW="2425680" imgH="393480" progId="Equation.3">
                   <p:embed/>
                 </p:oleObj>
               </mc:Choice>
@@ -28278,7 +28297,7 @@
           <a:graphicData uri="http://schemas.openxmlformats.org/presentationml/2006/ole">
             <mc:AlternateContent xmlns:mc="http://schemas.openxmlformats.org/markup-compatibility/2006">
               <mc:Choice xmlns:v="urn:schemas-microsoft-com:vml" Requires="v">
-                <p:oleObj spid="_x0000_s48210" name="Equation" r:id="rId4" imgW="2425680" imgH="393480" progId="Equation.3">
+                <p:oleObj spid="_x0000_s48214" name="Equation" r:id="rId4" imgW="2425680" imgH="393480" progId="Equation.3">
                   <p:embed/>
                 </p:oleObj>
               </mc:Choice>
@@ -28361,7 +28380,7 @@
           <a:graphicData uri="http://schemas.openxmlformats.org/presentationml/2006/ole">
             <mc:AlternateContent xmlns:mc="http://schemas.openxmlformats.org/markup-compatibility/2006">
               <mc:Choice xmlns:v="urn:schemas-microsoft-com:vml" Requires="v">
-                <p:oleObj spid="_x0000_s48211" name="Equation" r:id="rId6" imgW="1523880" imgH="444240" progId="Equation.3">
+                <p:oleObj spid="_x0000_s48215" name="Equation" r:id="rId6" imgW="1523880" imgH="444240" progId="Equation.3">
                   <p:embed/>
                 </p:oleObj>
               </mc:Choice>
@@ -30705,7 +30724,7 @@
           <a:graphicData uri="http://schemas.openxmlformats.org/presentationml/2006/ole">
             <mc:AlternateContent xmlns:mc="http://schemas.openxmlformats.org/markup-compatibility/2006">
               <mc:Choice xmlns:v="urn:schemas-microsoft-com:vml" Requires="v">
-                <p:oleObj spid="_x0000_s43149" name="Equation" r:id="rId4" imgW="634680" imgH="419040" progId="Equation.3">
+                <p:oleObj spid="_x0000_s43155" name="Equation" r:id="rId4" imgW="634680" imgH="419040" progId="Equation.3">
                   <p:embed/>
                 </p:oleObj>
               </mc:Choice>
@@ -30788,7 +30807,7 @@
           <a:graphicData uri="http://schemas.openxmlformats.org/presentationml/2006/ole">
             <mc:AlternateContent xmlns:mc="http://schemas.openxmlformats.org/markup-compatibility/2006">
               <mc:Choice xmlns:v="urn:schemas-microsoft-com:vml" Requires="v">
-                <p:oleObj spid="_x0000_s43150" name="Equation" r:id="rId6" imgW="685800" imgH="393480" progId="Equation.3">
+                <p:oleObj spid="_x0000_s43156" name="Equation" r:id="rId6" imgW="685800" imgH="393480" progId="Equation.3">
                   <p:embed/>
                 </p:oleObj>
               </mc:Choice>
@@ -30871,7 +30890,7 @@
           <a:graphicData uri="http://schemas.openxmlformats.org/presentationml/2006/ole">
             <mc:AlternateContent xmlns:mc="http://schemas.openxmlformats.org/markup-compatibility/2006">
               <mc:Choice xmlns:v="urn:schemas-microsoft-com:vml" Requires="v">
-                <p:oleObj spid="_x0000_s43151" name="Equation" r:id="rId8" imgW="444240" imgH="393480" progId="Equation.3">
+                <p:oleObj spid="_x0000_s43157" name="Equation" r:id="rId8" imgW="444240" imgH="393480" progId="Equation.3">
                   <p:embed/>
                 </p:oleObj>
               </mc:Choice>
@@ -31896,7 +31915,21 @@
                 <a:latin typeface="PFDinTextCompPro-Italic"/>
                 <a:cs typeface="PFDinTextCompPro-Italic"/>
               </a:rPr>
-              <a:t>In linear regression, we used a set of input variables to predict the value of a continuous response variable.</a:t>
+              <a:t>In linear regression, we </a:t>
+            </a:r>
+            <a:r>
+              <a:rPr lang="en-US" sz="3000" dirty="0" smtClean="0">
+                <a:latin typeface="PFDinTextCompPro-Italic"/>
+                <a:cs typeface="PFDinTextCompPro-Italic"/>
+              </a:rPr>
+              <a:t>use </a:t>
+            </a:r>
+            <a:r>
+              <a:rPr lang="en-US" sz="3000" dirty="0" smtClean="0">
+                <a:latin typeface="PFDinTextCompPro-Italic"/>
+                <a:cs typeface="PFDinTextCompPro-Italic"/>
+              </a:rPr>
+              <a:t>a set of input variables to predict the value of a continuous response variable.</a:t>
             </a:r>
           </a:p>
         </p:txBody>
@@ -32029,7 +32062,21 @@
                 <a:latin typeface="PFDinTextCompPro-Italic"/>
                 <a:cs typeface="PFDinTextCompPro-Italic"/>
               </a:rPr>
-              <a:t>In linear regression, we used a set of input variables to predict the value of a continuous response variable.</a:t>
+              <a:t>In linear regression, we </a:t>
+            </a:r>
+            <a:r>
+              <a:rPr lang="en-US" sz="3000" dirty="0" smtClean="0">
+                <a:latin typeface="PFDinTextCompPro-Italic"/>
+                <a:cs typeface="PFDinTextCompPro-Italic"/>
+              </a:rPr>
+              <a:t>use </a:t>
+            </a:r>
+            <a:r>
+              <a:rPr lang="en-US" sz="3000" dirty="0" smtClean="0">
+                <a:latin typeface="PFDinTextCompPro-Italic"/>
+                <a:cs typeface="PFDinTextCompPro-Italic"/>
+              </a:rPr>
+              <a:t>a set of input variables to predict the value of a continuous response variable.</a:t>
             </a:r>
           </a:p>
           <a:p>

</xml_diff>